<commit_message>
w9 complete w6 assignments marked and returned (except for a couple of EC)
</commit_message>
<xml_diff>
--- a/w8_jupyter_notebooks/w8_jupyter.pptx
+++ b/w8_jupyter_notebooks/w8_jupyter.pptx
@@ -142,7 +142,7 @@
   <p:extLst>
     <p:ext uri="{521415D9-36F7-43E2-AB2F-B90AF26B5E84}">
       <p14:sectionLst xmlns:p14="http://schemas.microsoft.com/office/powerpoint/2010/main">
-        <p14:section name="Default Section" id="{506324DF-37E7-4911-8F13-350A35C100EC}">
+        <p14:section name="Introduction" id="{506324DF-37E7-4911-8F13-350A35C100EC}">
           <p14:sldIdLst>
             <p14:sldId id="257"/>
             <p14:sldId id="258"/>
@@ -865,7 +865,7 @@
   <pc:docChgLst>
     <pc:chgData name="Peter McGinty" userId="138e04b35f3df159" providerId="LiveId" clId="{E5BE7CA5-6FDA-4509-A6DF-FC0C81693BBC}"/>
     <pc:docChg chg="custSel addSld modSld sldOrd addSection modSection">
-      <pc:chgData name="Peter McGinty" userId="138e04b35f3df159" providerId="LiveId" clId="{E5BE7CA5-6FDA-4509-A6DF-FC0C81693BBC}" dt="2021-11-14T18:22:29.892" v="6130" actId="20577"/>
+      <pc:chgData name="Peter McGinty" userId="138e04b35f3df159" providerId="LiveId" clId="{E5BE7CA5-6FDA-4509-A6DF-FC0C81693BBC}" dt="2021-11-20T09:08:30.944" v="6131" actId="17846"/>
       <pc:docMkLst>
         <pc:docMk/>
       </pc:docMkLst>
@@ -4371,7 +4371,7 @@
           <a:p>
             <a:fld id="{7A192637-BFDA-46FE-B306-083B272C9BF4}" type="datetimeFigureOut">
               <a:rPr lang="en-GB" smtClean="0"/>
-              <a:t>14/11/2021</a:t>
+              <a:t>20/11/2021</a:t>
             </a:fld>
             <a:endParaRPr lang="en-GB"/>
           </a:p>
@@ -4571,7 +4571,7 @@
           <a:p>
             <a:fld id="{7A192637-BFDA-46FE-B306-083B272C9BF4}" type="datetimeFigureOut">
               <a:rPr lang="en-GB" smtClean="0"/>
-              <a:t>14/11/2021</a:t>
+              <a:t>20/11/2021</a:t>
             </a:fld>
             <a:endParaRPr lang="en-GB"/>
           </a:p>
@@ -4781,7 +4781,7 @@
           <a:p>
             <a:fld id="{7A192637-BFDA-46FE-B306-083B272C9BF4}" type="datetimeFigureOut">
               <a:rPr lang="en-GB" smtClean="0"/>
-              <a:t>14/11/2021</a:t>
+              <a:t>20/11/2021</a:t>
             </a:fld>
             <a:endParaRPr lang="en-GB"/>
           </a:p>
@@ -4981,7 +4981,7 @@
           <a:p>
             <a:fld id="{7A192637-BFDA-46FE-B306-083B272C9BF4}" type="datetimeFigureOut">
               <a:rPr lang="en-GB" smtClean="0"/>
-              <a:t>14/11/2021</a:t>
+              <a:t>20/11/2021</a:t>
             </a:fld>
             <a:endParaRPr lang="en-GB"/>
           </a:p>
@@ -5257,7 +5257,7 @@
           <a:p>
             <a:fld id="{7A192637-BFDA-46FE-B306-083B272C9BF4}" type="datetimeFigureOut">
               <a:rPr lang="en-GB" smtClean="0"/>
-              <a:t>14/11/2021</a:t>
+              <a:t>20/11/2021</a:t>
             </a:fld>
             <a:endParaRPr lang="en-GB"/>
           </a:p>
@@ -5525,7 +5525,7 @@
           <a:p>
             <a:fld id="{7A192637-BFDA-46FE-B306-083B272C9BF4}" type="datetimeFigureOut">
               <a:rPr lang="en-GB" smtClean="0"/>
-              <a:t>14/11/2021</a:t>
+              <a:t>20/11/2021</a:t>
             </a:fld>
             <a:endParaRPr lang="en-GB"/>
           </a:p>
@@ -5940,7 +5940,7 @@
           <a:p>
             <a:fld id="{7A192637-BFDA-46FE-B306-083B272C9BF4}" type="datetimeFigureOut">
               <a:rPr lang="en-GB" smtClean="0"/>
-              <a:t>14/11/2021</a:t>
+              <a:t>20/11/2021</a:t>
             </a:fld>
             <a:endParaRPr lang="en-GB"/>
           </a:p>
@@ -6082,7 +6082,7 @@
           <a:p>
             <a:fld id="{7A192637-BFDA-46FE-B306-083B272C9BF4}" type="datetimeFigureOut">
               <a:rPr lang="en-GB" smtClean="0"/>
-              <a:t>14/11/2021</a:t>
+              <a:t>20/11/2021</a:t>
             </a:fld>
             <a:endParaRPr lang="en-GB"/>
           </a:p>
@@ -6195,7 +6195,7 @@
           <a:p>
             <a:fld id="{7A192637-BFDA-46FE-B306-083B272C9BF4}" type="datetimeFigureOut">
               <a:rPr lang="en-GB" smtClean="0"/>
-              <a:t>14/11/2021</a:t>
+              <a:t>20/11/2021</a:t>
             </a:fld>
             <a:endParaRPr lang="en-GB"/>
           </a:p>
@@ -6508,7 +6508,7 @@
           <a:p>
             <a:fld id="{7A192637-BFDA-46FE-B306-083B272C9BF4}" type="datetimeFigureOut">
               <a:rPr lang="en-GB" smtClean="0"/>
-              <a:t>14/11/2021</a:t>
+              <a:t>20/11/2021</a:t>
             </a:fld>
             <a:endParaRPr lang="en-GB"/>
           </a:p>
@@ -6797,7 +6797,7 @@
           <a:p>
             <a:fld id="{7A192637-BFDA-46FE-B306-083B272C9BF4}" type="datetimeFigureOut">
               <a:rPr lang="en-GB" smtClean="0"/>
-              <a:t>14/11/2021</a:t>
+              <a:t>20/11/2021</a:t>
             </a:fld>
             <a:endParaRPr lang="en-GB"/>
           </a:p>
@@ -7040,7 +7040,7 @@
           <a:p>
             <a:fld id="{7A192637-BFDA-46FE-B306-083B272C9BF4}" type="datetimeFigureOut">
               <a:rPr lang="en-GB" smtClean="0"/>
-              <a:t>14/11/2021</a:t>
+              <a:t>20/11/2021</a:t>
             </a:fld>
             <a:endParaRPr lang="en-GB"/>
           </a:p>

</xml_diff>